<commit_message>
Adicionando link do repositório
</commit_message>
<xml_diff>
--- a/Apresentação1.pptx
+++ b/Apresentação1.pptx
@@ -12869,18 +12869,18 @@
           <a:lstStyle/>
           <a:p>
             <a:r>
-              <a:rPr lang="en-US" sz="3200" b="1" dirty="0" err="1">
-                <a:latin typeface="Arial" panose="020B0604020202020204" pitchFamily="34" charset="0"/>
-                <a:cs typeface="Arial" panose="020B0604020202020204" pitchFamily="34" charset="0"/>
-              </a:rPr>
-              <a:t>Repositórios</a:t>
+              <a:rPr lang="en-US" sz="3200" b="1">
+                <a:latin typeface="Arial" panose="020B0604020202020204" pitchFamily="34" charset="0"/>
+                <a:cs typeface="Arial" panose="020B0604020202020204" pitchFamily="34" charset="0"/>
+              </a:rPr>
+              <a:t>Repositório </a:t>
             </a:r>
             <a:r>
               <a:rPr lang="en-US" sz="3200" b="1" dirty="0">
                 <a:latin typeface="Arial" panose="020B0604020202020204" pitchFamily="34" charset="0"/>
                 <a:cs typeface="Arial" panose="020B0604020202020204" pitchFamily="34" charset="0"/>
               </a:rPr>
-              <a:t> do trabalho PEI II</a:t>
+              <a:t>do trabalho PEI II</a:t>
             </a:r>
           </a:p>
         </p:txBody>
@@ -12903,8 +12903,8 @@
         </p:nvSpPr>
         <p:spPr>
           <a:xfrm>
-            <a:off x="1435100" y="1225273"/>
-            <a:ext cx="9002712" cy="5327927"/>
+            <a:off x="909428" y="3069111"/>
+            <a:ext cx="10196606" cy="388374"/>
           </a:xfrm>
         </p:spPr>
         <p:txBody>
@@ -12913,164 +12913,10 @@
           </a:bodyPr>
           <a:lstStyle/>
           <a:p>
-            <a:pPr algn="ctr"/>
-            <a:r>
-              <a:rPr lang="en-US" dirty="0">
-                <a:latin typeface="Arial" panose="020B0604020202020204" pitchFamily="34" charset="0"/>
-                <a:cs typeface="Arial" panose="020B0604020202020204" pitchFamily="34" charset="0"/>
-              </a:rPr>
-              <a:t>Amanda Silva Santos</a:t>
-            </a:r>
-          </a:p>
-          <a:p>
-            <a:pPr algn="ctr"/>
-            <a:r>
-              <a:rPr lang="en-US" dirty="0">
-                <a:latin typeface="Arial" panose="020B0604020202020204" pitchFamily="34" charset="0"/>
-                <a:cs typeface="Arial" panose="020B0604020202020204" pitchFamily="34" charset="0"/>
-              </a:rPr>
-              <a:t>Claudio Marcio Raimundo Bastos</a:t>
-            </a:r>
-          </a:p>
-          <a:p>
-            <a:pPr algn="ctr"/>
-            <a:r>
-              <a:rPr lang="en-US" dirty="0">
-                <a:latin typeface="Arial" panose="020B0604020202020204" pitchFamily="34" charset="0"/>
-                <a:cs typeface="Arial" panose="020B0604020202020204" pitchFamily="34" charset="0"/>
-              </a:rPr>
-              <a:t>Daniel Mendes</a:t>
-            </a:r>
-          </a:p>
-          <a:p>
-            <a:pPr algn="ctr"/>
-            <a:r>
-              <a:rPr lang="en-US" dirty="0">
-                <a:latin typeface="Arial" panose="020B0604020202020204" pitchFamily="34" charset="0"/>
-                <a:cs typeface="Arial" panose="020B0604020202020204" pitchFamily="34" charset="0"/>
-              </a:rPr>
-              <a:t>Hanna </a:t>
-            </a:r>
-            <a:r>
-              <a:rPr lang="en-US" dirty="0" err="1">
-                <a:latin typeface="Arial" panose="020B0604020202020204" pitchFamily="34" charset="0"/>
-                <a:cs typeface="Arial" panose="020B0604020202020204" pitchFamily="34" charset="0"/>
-              </a:rPr>
-              <a:t>Damásio</a:t>
-            </a:r>
-            <a:r>
-              <a:rPr lang="en-US" dirty="0">
-                <a:latin typeface="Arial" panose="020B0604020202020204" pitchFamily="34" charset="0"/>
-                <a:cs typeface="Arial" panose="020B0604020202020204" pitchFamily="34" charset="0"/>
-              </a:rPr>
-              <a:t> de Andrade Britto</a:t>
-            </a:r>
-          </a:p>
-          <a:p>
-            <a:pPr algn="ctr"/>
-            <a:r>
-              <a:rPr lang="en-US" dirty="0">
-                <a:latin typeface="Arial" panose="020B0604020202020204" pitchFamily="34" charset="0"/>
-                <a:cs typeface="Arial" panose="020B0604020202020204" pitchFamily="34" charset="0"/>
-              </a:rPr>
-              <a:t>Jefferson Cordeiro Vieira</a:t>
-            </a:r>
-          </a:p>
-          <a:p>
-            <a:pPr algn="ctr"/>
-            <a:r>
-              <a:rPr lang="en-US" dirty="0">
-                <a:latin typeface="Arial" panose="020B0604020202020204" pitchFamily="34" charset="0"/>
-                <a:cs typeface="Arial" panose="020B0604020202020204" pitchFamily="34" charset="0"/>
-              </a:rPr>
-              <a:t>Lucas </a:t>
-            </a:r>
-            <a:r>
-              <a:rPr lang="en-US" dirty="0" err="1">
-                <a:latin typeface="Arial" panose="020B0604020202020204" pitchFamily="34" charset="0"/>
-                <a:cs typeface="Arial" panose="020B0604020202020204" pitchFamily="34" charset="0"/>
-              </a:rPr>
-              <a:t>Torezani</a:t>
-            </a:r>
-            <a:r>
-              <a:rPr lang="en-US" dirty="0">
-                <a:latin typeface="Arial" panose="020B0604020202020204" pitchFamily="34" charset="0"/>
-                <a:cs typeface="Arial" panose="020B0604020202020204" pitchFamily="34" charset="0"/>
-              </a:rPr>
-              <a:t> Siqueira</a:t>
-            </a:r>
-          </a:p>
-          <a:p>
-            <a:pPr algn="ctr"/>
-            <a:r>
-              <a:rPr lang="en-US" dirty="0">
-                <a:latin typeface="Arial" panose="020B0604020202020204" pitchFamily="34" charset="0"/>
-                <a:cs typeface="Arial" panose="020B0604020202020204" pitchFamily="34" charset="0"/>
-              </a:rPr>
-              <a:t>Robson Carvalho Garcia</a:t>
-            </a:r>
-          </a:p>
-          <a:p>
-            <a:pPr algn="ctr"/>
-            <a:r>
-              <a:rPr lang="en-US" dirty="0" err="1">
-                <a:latin typeface="Arial" panose="020B0604020202020204" pitchFamily="34" charset="0"/>
-                <a:cs typeface="Arial" panose="020B0604020202020204" pitchFamily="34" charset="0"/>
-              </a:rPr>
-              <a:t>Sheyla</a:t>
-            </a:r>
-            <a:r>
-              <a:rPr lang="en-US" dirty="0">
-                <a:latin typeface="Arial" panose="020B0604020202020204" pitchFamily="34" charset="0"/>
-                <a:cs typeface="Arial" panose="020B0604020202020204" pitchFamily="34" charset="0"/>
-              </a:rPr>
-              <a:t> Madeira </a:t>
-            </a:r>
-            <a:r>
-              <a:rPr lang="en-US" dirty="0" err="1">
-                <a:latin typeface="Arial" panose="020B0604020202020204" pitchFamily="34" charset="0"/>
-                <a:cs typeface="Arial" panose="020B0604020202020204" pitchFamily="34" charset="0"/>
-              </a:rPr>
-              <a:t>Leite</a:t>
-            </a:r>
-            <a:endParaRPr lang="en-US" dirty="0">
-              <a:latin typeface="Arial" panose="020B0604020202020204" pitchFamily="34" charset="0"/>
-              <a:cs typeface="Arial" panose="020B0604020202020204" pitchFamily="34" charset="0"/>
-            </a:endParaRPr>
-          </a:p>
-          <a:p>
-            <a:pPr algn="ctr"/>
-            <a:r>
-              <a:rPr lang="en-US" dirty="0">
-                <a:latin typeface="Arial" panose="020B0604020202020204" pitchFamily="34" charset="0"/>
-                <a:cs typeface="Arial" panose="020B0604020202020204" pitchFamily="34" charset="0"/>
-              </a:rPr>
-              <a:t>Tiago Gonçalves Cesar</a:t>
-            </a:r>
-          </a:p>
-          <a:p>
-            <a:pPr algn="ctr"/>
-            <a:r>
-              <a:rPr lang="en-US" dirty="0">
-                <a:latin typeface="Arial" panose="020B0604020202020204" pitchFamily="34" charset="0"/>
-                <a:cs typeface="Arial" panose="020B0604020202020204" pitchFamily="34" charset="0"/>
-              </a:rPr>
-              <a:t>Willian César </a:t>
-            </a:r>
-            <a:r>
-              <a:rPr lang="en-US" dirty="0" err="1">
-                <a:latin typeface="Arial" panose="020B0604020202020204" pitchFamily="34" charset="0"/>
-                <a:cs typeface="Arial" panose="020B0604020202020204" pitchFamily="34" charset="0"/>
-              </a:rPr>
-              <a:t>Ciurlleti</a:t>
-            </a:r>
-            <a:endParaRPr lang="en-US" dirty="0">
-              <a:latin typeface="Arial" panose="020B0604020202020204" pitchFamily="34" charset="0"/>
-              <a:cs typeface="Arial" panose="020B0604020202020204" pitchFamily="34" charset="0"/>
-            </a:endParaRPr>
-          </a:p>
-          <a:p>
-            <a:endParaRPr lang="en-US" dirty="0"/>
+            <a:r>
+              <a:rPr lang="en-US" dirty="0"/>
+              <a:t>https://github.com/ClaudioMRB/Projeto-de-Extens-o-e-Inova-o-Interdisciplinar-II.git</a:t>
+            </a:r>
           </a:p>
         </p:txBody>
       </p:sp>

</xml_diff>

<commit_message>
Alterando o projeto Apresentação1.pptx
</commit_message>
<xml_diff>
--- a/Apresentação1.pptx
+++ b/Apresentação1.pptx
@@ -12195,7 +12195,7 @@
         </p:blipFill>
         <p:spPr>
           <a:xfrm>
-            <a:off x="5979843" y="134937"/>
+            <a:off x="4662031" y="141194"/>
             <a:ext cx="4962525" cy="6334125"/>
           </a:xfrm>
           <a:prstGeom prst="rect">
@@ -12203,6 +12203,154 @@
           </a:prstGeom>
         </p:spPr>
       </p:pic>
+      <p:sp>
+        <p:nvSpPr>
+          <p:cNvPr id="4" name="Seta: para a Direita 3">
+            <a:hlinkClick r:id="" action="ppaction://hlinkshowjump?jump=nextslide"/>
+            <a:extLst>
+              <a:ext uri="{FF2B5EF4-FFF2-40B4-BE49-F238E27FC236}">
+                <a16:creationId xmlns:a16="http://schemas.microsoft.com/office/drawing/2014/main" id="{8EB5DF36-5B79-4864-A1A9-11BEEBB6AB9D}"/>
+              </a:ext>
+            </a:extLst>
+          </p:cNvPr>
+          <p:cNvSpPr/>
+          <p:nvPr/>
+        </p:nvSpPr>
+        <p:spPr>
+          <a:xfrm>
+            <a:off x="11571193" y="6293224"/>
+            <a:ext cx="430306" cy="457200"/>
+          </a:xfrm>
+          <a:prstGeom prst="rightArrow">
+            <a:avLst/>
+          </a:prstGeom>
+        </p:spPr>
+        <p:style>
+          <a:lnRef idx="2">
+            <a:schemeClr val="accent6">
+              <a:shade val="50000"/>
+            </a:schemeClr>
+          </a:lnRef>
+          <a:fillRef idx="1">
+            <a:schemeClr val="accent6"/>
+          </a:fillRef>
+          <a:effectRef idx="0">
+            <a:schemeClr val="accent6"/>
+          </a:effectRef>
+          <a:fontRef idx="minor">
+            <a:schemeClr val="lt1"/>
+          </a:fontRef>
+        </p:style>
+        <p:txBody>
+          <a:bodyPr rtlCol="0" anchor="ctr"/>
+          <a:lstStyle/>
+          <a:p>
+            <a:pPr algn="ctr"/>
+            <a:endParaRPr lang="en-US"/>
+          </a:p>
+        </p:txBody>
+      </p:sp>
+      <p:sp>
+        <p:nvSpPr>
+          <p:cNvPr id="6" name="Seta: para a Esquerda 5">
+            <a:hlinkClick r:id="" action="ppaction://hlinkshowjump?jump=previousslide"/>
+            <a:extLst>
+              <a:ext uri="{FF2B5EF4-FFF2-40B4-BE49-F238E27FC236}">
+                <a16:creationId xmlns:a16="http://schemas.microsoft.com/office/drawing/2014/main" id="{D7215343-5574-40E8-A5AE-910813FEDD9F}"/>
+              </a:ext>
+            </a:extLst>
+          </p:cNvPr>
+          <p:cNvSpPr/>
+          <p:nvPr/>
+        </p:nvSpPr>
+        <p:spPr>
+          <a:xfrm>
+            <a:off x="10982885" y="6293224"/>
+            <a:ext cx="430306" cy="457200"/>
+          </a:xfrm>
+          <a:prstGeom prst="leftArrow">
+            <a:avLst>
+              <a:gd name="adj1" fmla="val 50000"/>
+              <a:gd name="adj2" fmla="val 55556"/>
+            </a:avLst>
+          </a:prstGeom>
+        </p:spPr>
+        <p:style>
+          <a:lnRef idx="2">
+            <a:schemeClr val="accent6">
+              <a:shade val="50000"/>
+            </a:schemeClr>
+          </a:lnRef>
+          <a:fillRef idx="1">
+            <a:schemeClr val="accent6"/>
+          </a:fillRef>
+          <a:effectRef idx="0">
+            <a:schemeClr val="accent6"/>
+          </a:effectRef>
+          <a:fontRef idx="minor">
+            <a:schemeClr val="lt1"/>
+          </a:fontRef>
+        </p:style>
+        <p:txBody>
+          <a:bodyPr rtlCol="0" anchor="ctr"/>
+          <a:lstStyle/>
+          <a:p>
+            <a:pPr algn="ctr"/>
+            <a:endParaRPr lang="en-US"/>
+          </a:p>
+        </p:txBody>
+      </p:sp>
+      <p:sp>
+        <p:nvSpPr>
+          <p:cNvPr id="7" name="Retângulo 6">
+            <a:hlinkClick r:id="rId3" action="ppaction://hlinksldjump"/>
+            <a:extLst>
+              <a:ext uri="{FF2B5EF4-FFF2-40B4-BE49-F238E27FC236}">
+                <a16:creationId xmlns:a16="http://schemas.microsoft.com/office/drawing/2014/main" id="{88FD8820-22E6-4449-943C-A7D75DFBC24A}"/>
+              </a:ext>
+            </a:extLst>
+          </p:cNvPr>
+          <p:cNvSpPr/>
+          <p:nvPr/>
+        </p:nvSpPr>
+        <p:spPr>
+          <a:xfrm>
+            <a:off x="9433112" y="6353735"/>
+            <a:ext cx="1331259" cy="336177"/>
+          </a:xfrm>
+          <a:prstGeom prst="rect">
+            <a:avLst/>
+          </a:prstGeom>
+        </p:spPr>
+        <p:style>
+          <a:lnRef idx="2">
+            <a:schemeClr val="accent6">
+              <a:shade val="50000"/>
+            </a:schemeClr>
+          </a:lnRef>
+          <a:fillRef idx="1">
+            <a:schemeClr val="accent6"/>
+          </a:fillRef>
+          <a:effectRef idx="0">
+            <a:schemeClr val="accent6"/>
+          </a:effectRef>
+          <a:fontRef idx="minor">
+            <a:schemeClr val="lt1"/>
+          </a:fontRef>
+        </p:style>
+        <p:txBody>
+          <a:bodyPr rtlCol="0" anchor="ctr"/>
+          <a:lstStyle/>
+          <a:p>
+            <a:pPr algn="ctr"/>
+            <a:r>
+              <a:rPr lang="en-US" dirty="0" err="1"/>
+              <a:t>Sumário</a:t>
+            </a:r>
+            <a:endParaRPr lang="en-US" dirty="0"/>
+          </a:p>
+        </p:txBody>
+      </p:sp>
     </p:spTree>
     <p:extLst>
       <p:ext uri="{BB962C8B-B14F-4D97-AF65-F5344CB8AC3E}">
@@ -12751,6 +12899,7 @@
       <p:sp>
         <p:nvSpPr>
           <p:cNvPr id="13" name="Retângulo: Cantos Arredondados 12">
+            <a:hlinkClick r:id="rId10" action="ppaction://hlinksldjump"/>
             <a:extLst>
               <a:ext uri="{FF2B5EF4-FFF2-40B4-BE49-F238E27FC236}">
                 <a16:creationId xmlns:a16="http://schemas.microsoft.com/office/drawing/2014/main" id="{2780F3B5-F4A0-412E-B22F-14446D9AD763}"/>
@@ -12917,6 +13066,107 @@
               <a:rPr lang="en-US" dirty="0"/>
               <a:t>https://github.com/ClaudioMRB/Projeto-de-Extens-o-e-Inova-o-Interdisciplinar-II.git</a:t>
             </a:r>
+          </a:p>
+        </p:txBody>
+      </p:sp>
+      <p:sp>
+        <p:nvSpPr>
+          <p:cNvPr id="5" name="Seta: para a Esquerda 4">
+            <a:hlinkClick r:id="" action="ppaction://hlinkshowjump?jump=previousslide"/>
+            <a:extLst>
+              <a:ext uri="{FF2B5EF4-FFF2-40B4-BE49-F238E27FC236}">
+                <a16:creationId xmlns:a16="http://schemas.microsoft.com/office/drawing/2014/main" id="{16F86F95-02BE-4B43-82A1-01D077112079}"/>
+              </a:ext>
+            </a:extLst>
+          </p:cNvPr>
+          <p:cNvSpPr/>
+          <p:nvPr/>
+        </p:nvSpPr>
+        <p:spPr>
+          <a:xfrm>
+            <a:off x="10902203" y="6320118"/>
+            <a:ext cx="430306" cy="457200"/>
+          </a:xfrm>
+          <a:prstGeom prst="leftArrow">
+            <a:avLst>
+              <a:gd name="adj1" fmla="val 50000"/>
+              <a:gd name="adj2" fmla="val 55556"/>
+            </a:avLst>
+          </a:prstGeom>
+        </p:spPr>
+        <p:style>
+          <a:lnRef idx="2">
+            <a:schemeClr val="accent6">
+              <a:shade val="50000"/>
+            </a:schemeClr>
+          </a:lnRef>
+          <a:fillRef idx="1">
+            <a:schemeClr val="accent6"/>
+          </a:fillRef>
+          <a:effectRef idx="0">
+            <a:schemeClr val="accent6"/>
+          </a:effectRef>
+          <a:fontRef idx="minor">
+            <a:schemeClr val="lt1"/>
+          </a:fontRef>
+        </p:style>
+        <p:txBody>
+          <a:bodyPr rtlCol="0" anchor="ctr"/>
+          <a:lstStyle/>
+          <a:p>
+            <a:pPr algn="ctr"/>
+            <a:endParaRPr lang="en-US"/>
+          </a:p>
+        </p:txBody>
+      </p:sp>
+      <p:sp>
+        <p:nvSpPr>
+          <p:cNvPr id="6" name="Retângulo 5">
+            <a:hlinkClick r:id="rId2" action="ppaction://hlinksldjump"/>
+            <a:extLst>
+              <a:ext uri="{FF2B5EF4-FFF2-40B4-BE49-F238E27FC236}">
+                <a16:creationId xmlns:a16="http://schemas.microsoft.com/office/drawing/2014/main" id="{434F6A72-64A7-42FD-9D20-5BA927ADE3C2}"/>
+              </a:ext>
+            </a:extLst>
+          </p:cNvPr>
+          <p:cNvSpPr/>
+          <p:nvPr/>
+        </p:nvSpPr>
+        <p:spPr>
+          <a:xfrm>
+            <a:off x="9352430" y="6380629"/>
+            <a:ext cx="1331259" cy="336177"/>
+          </a:xfrm>
+          <a:prstGeom prst="rect">
+            <a:avLst/>
+          </a:prstGeom>
+        </p:spPr>
+        <p:style>
+          <a:lnRef idx="2">
+            <a:schemeClr val="accent6">
+              <a:shade val="50000"/>
+            </a:schemeClr>
+          </a:lnRef>
+          <a:fillRef idx="1">
+            <a:schemeClr val="accent6"/>
+          </a:fillRef>
+          <a:effectRef idx="0">
+            <a:schemeClr val="accent6"/>
+          </a:effectRef>
+          <a:fontRef idx="minor">
+            <a:schemeClr val="lt1"/>
+          </a:fontRef>
+        </p:style>
+        <p:txBody>
+          <a:bodyPr rtlCol="0" anchor="ctr"/>
+          <a:lstStyle/>
+          <a:p>
+            <a:pPr algn="ctr"/>
+            <a:r>
+              <a:rPr lang="en-US" dirty="0" err="1"/>
+              <a:t>Sumário</a:t>
+            </a:r>
+            <a:endParaRPr lang="en-US" dirty="0"/>
           </a:p>
         </p:txBody>
       </p:sp>

</xml_diff>